<commit_message>
Final Zip and Recording for the EDA Project,
</commit_message>
<xml_diff>
--- a/term1/projects/CarSales/Term1-EDAProject-CarSales-DhavalParikh.pptx
+++ b/term1/projects/CarSales/Term1-EDAProject-CarSales-DhavalParikh.pptx
@@ -1390,7 +1390,7 @@
           <a:noFill/>
           <a:extLst>
             <a:ext uri="{909E8E84-426E-40dd-AFC4-6F175D3DCCD1}">
-              <a14:hiddenFill xmlns:a14="http://schemas.microsoft.com/office/drawing/2010/main" xmlns="">
+              <a14:hiddenFill xmlns="" xmlns:a14="http://schemas.microsoft.com/office/drawing/2010/main">
                 <a:solidFill>
                   <a:srgbClr val="FFFFFF"/>
                 </a:solidFill>
@@ -1450,7 +1450,7 @@
             </a:ln>
             <a:extLst>
               <a:ext uri="{91240B29-F687-4f45-9708-019B960494DF}">
-                <a14:hiddenLine xmlns:a14="http://schemas.microsoft.com/office/drawing/2010/main" xmlns="" w="9525">
+                <a14:hiddenLine xmlns="" xmlns:a14="http://schemas.microsoft.com/office/drawing/2010/main" w="9525">
                   <a:solidFill>
                     <a:srgbClr val="000000"/>
                   </a:solidFill>
@@ -1540,7 +1540,7 @@
             </a:ln>
             <a:extLst>
               <a:ext uri="{91240B29-F687-4f45-9708-019B960494DF}">
-                <a14:hiddenLine xmlns:a14="http://schemas.microsoft.com/office/drawing/2010/main" xmlns="" w="9525">
+                <a14:hiddenLine xmlns="" xmlns:a14="http://schemas.microsoft.com/office/drawing/2010/main" w="9525">
                   <a:solidFill>
                     <a:srgbClr val="000000"/>
                   </a:solidFill>
@@ -1630,7 +1630,7 @@
             </a:ln>
             <a:extLst>
               <a:ext uri="{91240B29-F687-4f45-9708-019B960494DF}">
-                <a14:hiddenLine xmlns:a14="http://schemas.microsoft.com/office/drawing/2010/main" xmlns="" w="9525">
+                <a14:hiddenLine xmlns="" xmlns:a14="http://schemas.microsoft.com/office/drawing/2010/main" w="9525">
                   <a:solidFill>
                     <a:srgbClr val="000000"/>
                   </a:solidFill>
@@ -1664,7 +1664,7 @@
             </a:ln>
             <a:extLst>
               <a:ext uri="{91240B29-F687-4f45-9708-019B960494DF}">
-                <a14:hiddenLine xmlns:a14="http://schemas.microsoft.com/office/drawing/2010/main" xmlns="" w="9525">
+                <a14:hiddenLine xmlns="" xmlns:a14="http://schemas.microsoft.com/office/drawing/2010/main" w="9525">
                   <a:solidFill>
                     <a:srgbClr val="000000"/>
                   </a:solidFill>
@@ -1754,7 +1754,7 @@
             </a:ln>
             <a:extLst>
               <a:ext uri="{91240B29-F687-4f45-9708-019B960494DF}">
-                <a14:hiddenLine xmlns:a14="http://schemas.microsoft.com/office/drawing/2010/main" xmlns="" w="9525">
+                <a14:hiddenLine xmlns="" xmlns:a14="http://schemas.microsoft.com/office/drawing/2010/main" w="9525">
                   <a:solidFill>
                     <a:srgbClr val="000000"/>
                   </a:solidFill>
@@ -1816,7 +1816,7 @@
             </a:ln>
             <a:extLst>
               <a:ext uri="{91240B29-F687-4f45-9708-019B960494DF}">
-                <a14:hiddenLine xmlns:a14="http://schemas.microsoft.com/office/drawing/2010/main" xmlns="" w="9525">
+                <a14:hiddenLine xmlns="" xmlns:a14="http://schemas.microsoft.com/office/drawing/2010/main" w="9525">
                   <a:solidFill>
                     <a:srgbClr val="000000"/>
                   </a:solidFill>
@@ -1878,7 +1878,7 @@
             </a:ln>
             <a:extLst>
               <a:ext uri="{91240B29-F687-4f45-9708-019B960494DF}">
-                <a14:hiddenLine xmlns:a14="http://schemas.microsoft.com/office/drawing/2010/main" xmlns="" w="9525">
+                <a14:hiddenLine xmlns="" xmlns:a14="http://schemas.microsoft.com/office/drawing/2010/main" w="9525">
                   <a:solidFill>
                     <a:srgbClr val="000000"/>
                   </a:solidFill>
@@ -1968,7 +1968,7 @@
             </a:ln>
             <a:extLst>
               <a:ext uri="{91240B29-F687-4f45-9708-019B960494DF}">
-                <a14:hiddenLine xmlns:a14="http://schemas.microsoft.com/office/drawing/2010/main" xmlns="" w="9525">
+                <a14:hiddenLine xmlns="" xmlns:a14="http://schemas.microsoft.com/office/drawing/2010/main" w="9525">
                   <a:solidFill>
                     <a:srgbClr val="000000"/>
                   </a:solidFill>
@@ -2030,7 +2030,7 @@
             </a:ln>
             <a:extLst>
               <a:ext uri="{91240B29-F687-4f45-9708-019B960494DF}">
-                <a14:hiddenLine xmlns:a14="http://schemas.microsoft.com/office/drawing/2010/main" xmlns="" w="9525">
+                <a14:hiddenLine xmlns="" xmlns:a14="http://schemas.microsoft.com/office/drawing/2010/main" w="9525">
                   <a:solidFill>
                     <a:srgbClr val="000000"/>
                   </a:solidFill>
@@ -2092,7 +2092,7 @@
             </a:ln>
             <a:extLst>
               <a:ext uri="{91240B29-F687-4f45-9708-019B960494DF}">
-                <a14:hiddenLine xmlns:a14="http://schemas.microsoft.com/office/drawing/2010/main" xmlns="" w="9525">
+                <a14:hiddenLine xmlns="" xmlns:a14="http://schemas.microsoft.com/office/drawing/2010/main" w="9525">
                   <a:solidFill>
                     <a:srgbClr val="000000"/>
                   </a:solidFill>
@@ -2182,7 +2182,7 @@
             </a:ln>
             <a:extLst>
               <a:ext uri="{91240B29-F687-4f45-9708-019B960494DF}">
-                <a14:hiddenLine xmlns:a14="http://schemas.microsoft.com/office/drawing/2010/main" xmlns="" w="9525">
+                <a14:hiddenLine xmlns="" xmlns:a14="http://schemas.microsoft.com/office/drawing/2010/main" w="9525">
                   <a:solidFill>
                     <a:srgbClr val="000000"/>
                   </a:solidFill>
@@ -2272,7 +2272,7 @@
             </a:ln>
             <a:extLst>
               <a:ext uri="{91240B29-F687-4f45-9708-019B960494DF}">
-                <a14:hiddenLine xmlns:a14="http://schemas.microsoft.com/office/drawing/2010/main" xmlns="" w="9525">
+                <a14:hiddenLine xmlns="" xmlns:a14="http://schemas.microsoft.com/office/drawing/2010/main" w="9525">
                   <a:solidFill>
                     <a:srgbClr val="000000"/>
                   </a:solidFill>
@@ -2334,7 +2334,7 @@
             </a:ln>
             <a:extLst>
               <a:ext uri="{91240B29-F687-4f45-9708-019B960494DF}">
-                <a14:hiddenLine xmlns:a14="http://schemas.microsoft.com/office/drawing/2010/main" xmlns="" w="9525">
+                <a14:hiddenLine xmlns="" xmlns:a14="http://schemas.microsoft.com/office/drawing/2010/main" w="9525">
                   <a:solidFill>
                     <a:srgbClr val="000000"/>
                   </a:solidFill>
@@ -2444,7 +2444,7 @@
             </a:ln>
             <a:extLst>
               <a:ext uri="{91240B29-F687-4f45-9708-019B960494DF}">
-                <a14:hiddenLine xmlns:a14="http://schemas.microsoft.com/office/drawing/2010/main" xmlns="" w="9525">
+                <a14:hiddenLine xmlns="" xmlns:a14="http://schemas.microsoft.com/office/drawing/2010/main" w="9525">
                   <a:solidFill>
                     <a:srgbClr val="000000"/>
                   </a:solidFill>
@@ -2506,7 +2506,7 @@
             </a:ln>
             <a:extLst>
               <a:ext uri="{91240B29-F687-4f45-9708-019B960494DF}">
-                <a14:hiddenLine xmlns:a14="http://schemas.microsoft.com/office/drawing/2010/main" xmlns="" w="9525">
+                <a14:hiddenLine xmlns="" xmlns:a14="http://schemas.microsoft.com/office/drawing/2010/main" w="9525">
                   <a:solidFill>
                     <a:srgbClr val="000000"/>
                   </a:solidFill>
@@ -2596,7 +2596,7 @@
             </a:ln>
             <a:extLst>
               <a:ext uri="{91240B29-F687-4f45-9708-019B960494DF}">
-                <a14:hiddenLine xmlns:a14="http://schemas.microsoft.com/office/drawing/2010/main" xmlns="" w="9525">
+                <a14:hiddenLine xmlns="" xmlns:a14="http://schemas.microsoft.com/office/drawing/2010/main" w="9525">
                   <a:solidFill>
                     <a:srgbClr val="000000"/>
                   </a:solidFill>
@@ -2686,7 +2686,7 @@
             </a:ln>
             <a:extLst>
               <a:ext uri="{91240B29-F687-4f45-9708-019B960494DF}">
-                <a14:hiddenLine xmlns:a14="http://schemas.microsoft.com/office/drawing/2010/main" xmlns="" w="9525">
+                <a14:hiddenLine xmlns="" xmlns:a14="http://schemas.microsoft.com/office/drawing/2010/main" w="9525">
                   <a:solidFill>
                     <a:srgbClr val="000000"/>
                   </a:solidFill>
@@ -2748,7 +2748,7 @@
             </a:ln>
             <a:extLst>
               <a:ext uri="{91240B29-F687-4f45-9708-019B960494DF}">
-                <a14:hiddenLine xmlns:a14="http://schemas.microsoft.com/office/drawing/2010/main" xmlns="" w="9525">
+                <a14:hiddenLine xmlns="" xmlns:a14="http://schemas.microsoft.com/office/drawing/2010/main" w="9525">
                   <a:solidFill>
                     <a:srgbClr val="000000"/>
                   </a:solidFill>
@@ -2838,7 +2838,7 @@
             </a:ln>
             <a:extLst>
               <a:ext uri="{91240B29-F687-4f45-9708-019B960494DF}">
-                <a14:hiddenLine xmlns:a14="http://schemas.microsoft.com/office/drawing/2010/main" xmlns="" w="9525">
+                <a14:hiddenLine xmlns="" xmlns:a14="http://schemas.microsoft.com/office/drawing/2010/main" w="9525">
                   <a:solidFill>
                     <a:srgbClr val="000000"/>
                   </a:solidFill>
@@ -2928,7 +2928,7 @@
             </a:ln>
             <a:extLst>
               <a:ext uri="{91240B29-F687-4f45-9708-019B960494DF}">
-                <a14:hiddenLine xmlns:a14="http://schemas.microsoft.com/office/drawing/2010/main" xmlns="" w="9525">
+                <a14:hiddenLine xmlns="" xmlns:a14="http://schemas.microsoft.com/office/drawing/2010/main" w="9525">
                   <a:solidFill>
                     <a:srgbClr val="000000"/>
                   </a:solidFill>
@@ -2984,7 +2984,7 @@
             </a:ln>
             <a:extLst>
               <a:ext uri="{91240B29-F687-4f45-9708-019B960494DF}">
-                <a14:hiddenLine xmlns:a14="http://schemas.microsoft.com/office/drawing/2010/main" xmlns="" w="9525">
+                <a14:hiddenLine xmlns="" xmlns:a14="http://schemas.microsoft.com/office/drawing/2010/main" w="9525">
                   <a:solidFill>
                     <a:srgbClr val="000000"/>
                   </a:solidFill>
@@ -3074,7 +3074,7 @@
             </a:ln>
             <a:extLst>
               <a:ext uri="{91240B29-F687-4f45-9708-019B960494DF}">
-                <a14:hiddenLine xmlns:a14="http://schemas.microsoft.com/office/drawing/2010/main" xmlns="" w="9525">
+                <a14:hiddenLine xmlns="" xmlns:a14="http://schemas.microsoft.com/office/drawing/2010/main" w="9525">
                   <a:solidFill>
                     <a:srgbClr val="000000"/>
                   </a:solidFill>
@@ -3130,7 +3130,7 @@
             </a:ln>
             <a:extLst>
               <a:ext uri="{91240B29-F687-4f45-9708-019B960494DF}">
-                <a14:hiddenLine xmlns:a14="http://schemas.microsoft.com/office/drawing/2010/main" xmlns="" w="9525">
+                <a14:hiddenLine xmlns="" xmlns:a14="http://schemas.microsoft.com/office/drawing/2010/main" w="9525">
                   <a:solidFill>
                     <a:srgbClr val="000000"/>
                   </a:solidFill>
@@ -3220,7 +3220,7 @@
             </a:ln>
             <a:extLst>
               <a:ext uri="{91240B29-F687-4f45-9708-019B960494DF}">
-                <a14:hiddenLine xmlns:a14="http://schemas.microsoft.com/office/drawing/2010/main" xmlns="" w="9525">
+                <a14:hiddenLine xmlns="" xmlns:a14="http://schemas.microsoft.com/office/drawing/2010/main" w="9525">
                   <a:solidFill>
                     <a:srgbClr val="000000"/>
                   </a:solidFill>
@@ -3288,7 +3288,7 @@
             </a:ln>
             <a:extLst>
               <a:ext uri="{91240B29-F687-4f45-9708-019B960494DF}">
-                <a14:hiddenLine xmlns:a14="http://schemas.microsoft.com/office/drawing/2010/main" xmlns="" w="9525">
+                <a14:hiddenLine xmlns="" xmlns:a14="http://schemas.microsoft.com/office/drawing/2010/main" w="9525">
                   <a:solidFill>
                     <a:srgbClr val="000000"/>
                   </a:solidFill>
@@ -3378,7 +3378,7 @@
             </a:ln>
             <a:extLst>
               <a:ext uri="{91240B29-F687-4f45-9708-019B960494DF}">
-                <a14:hiddenLine xmlns:a14="http://schemas.microsoft.com/office/drawing/2010/main" xmlns="" w="9525">
+                <a14:hiddenLine xmlns="" xmlns:a14="http://schemas.microsoft.com/office/drawing/2010/main" w="9525">
                   <a:solidFill>
                     <a:srgbClr val="000000"/>
                   </a:solidFill>
@@ -3446,7 +3446,7 @@
             </a:ln>
             <a:extLst>
               <a:ext uri="{91240B29-F687-4f45-9708-019B960494DF}">
-                <a14:hiddenLine xmlns:a14="http://schemas.microsoft.com/office/drawing/2010/main" xmlns="" w="9525">
+                <a14:hiddenLine xmlns="" xmlns:a14="http://schemas.microsoft.com/office/drawing/2010/main" w="9525">
                   <a:solidFill>
                     <a:srgbClr val="000000"/>
                   </a:solidFill>
@@ -3536,7 +3536,7 @@
             </a:ln>
             <a:extLst>
               <a:ext uri="{91240B29-F687-4f45-9708-019B960494DF}">
-                <a14:hiddenLine xmlns:a14="http://schemas.microsoft.com/office/drawing/2010/main" xmlns="" w="9525">
+                <a14:hiddenLine xmlns="" xmlns:a14="http://schemas.microsoft.com/office/drawing/2010/main" w="9525">
                   <a:solidFill>
                     <a:srgbClr val="000000"/>
                   </a:solidFill>
@@ -3570,7 +3570,7 @@
             </a:ln>
             <a:extLst>
               <a:ext uri="{91240B29-F687-4f45-9708-019B960494DF}">
-                <a14:hiddenLine xmlns:a14="http://schemas.microsoft.com/office/drawing/2010/main" xmlns="" w="9525">
+                <a14:hiddenLine xmlns="" xmlns:a14="http://schemas.microsoft.com/office/drawing/2010/main" w="9525">
                   <a:solidFill>
                     <a:srgbClr val="000000"/>
                   </a:solidFill>
@@ -3660,7 +3660,7 @@
             </a:ln>
             <a:extLst>
               <a:ext uri="{91240B29-F687-4f45-9708-019B960494DF}">
-                <a14:hiddenLine xmlns:a14="http://schemas.microsoft.com/office/drawing/2010/main" xmlns="" w="9525">
+                <a14:hiddenLine xmlns="" xmlns:a14="http://schemas.microsoft.com/office/drawing/2010/main" w="9525">
                   <a:solidFill>
                     <a:srgbClr val="000000"/>
                   </a:solidFill>
@@ -3722,7 +3722,7 @@
             </a:ln>
             <a:extLst>
               <a:ext uri="{91240B29-F687-4f45-9708-019B960494DF}">
-                <a14:hiddenLine xmlns:a14="http://schemas.microsoft.com/office/drawing/2010/main" xmlns="" w="9525">
+                <a14:hiddenLine xmlns="" xmlns:a14="http://schemas.microsoft.com/office/drawing/2010/main" w="9525">
                   <a:solidFill>
                     <a:srgbClr val="000000"/>
                   </a:solidFill>
@@ -3784,7 +3784,7 @@
             </a:ln>
             <a:extLst>
               <a:ext uri="{91240B29-F687-4f45-9708-019B960494DF}">
-                <a14:hiddenLine xmlns:a14="http://schemas.microsoft.com/office/drawing/2010/main" xmlns="" w="9525">
+                <a14:hiddenLine xmlns="" xmlns:a14="http://schemas.microsoft.com/office/drawing/2010/main" w="9525">
                   <a:solidFill>
                     <a:srgbClr val="000000"/>
                   </a:solidFill>
@@ -3874,7 +3874,7 @@
             </a:ln>
             <a:extLst>
               <a:ext uri="{91240B29-F687-4f45-9708-019B960494DF}">
-                <a14:hiddenLine xmlns:a14="http://schemas.microsoft.com/office/drawing/2010/main" xmlns="" w="9525">
+                <a14:hiddenLine xmlns="" xmlns:a14="http://schemas.microsoft.com/office/drawing/2010/main" w="9525">
                   <a:solidFill>
                     <a:srgbClr val="000000"/>
                   </a:solidFill>
@@ -3942,7 +3942,7 @@
             </a:ln>
             <a:extLst>
               <a:ext uri="{91240B29-F687-4f45-9708-019B960494DF}">
-                <a14:hiddenLine xmlns:a14="http://schemas.microsoft.com/office/drawing/2010/main" xmlns="" w="9525">
+                <a14:hiddenLine xmlns="" xmlns:a14="http://schemas.microsoft.com/office/drawing/2010/main" w="9525">
                   <a:solidFill>
                     <a:srgbClr val="000000"/>
                   </a:solidFill>
@@ -4004,7 +4004,7 @@
             </a:ln>
             <a:extLst>
               <a:ext uri="{91240B29-F687-4f45-9708-019B960494DF}">
-                <a14:hiddenLine xmlns:a14="http://schemas.microsoft.com/office/drawing/2010/main" xmlns="" w="9525">
+                <a14:hiddenLine xmlns="" xmlns:a14="http://schemas.microsoft.com/office/drawing/2010/main" w="9525">
                   <a:solidFill>
                     <a:srgbClr val="000000"/>
                   </a:solidFill>
@@ -4094,7 +4094,7 @@
             </a:ln>
             <a:extLst>
               <a:ext uri="{91240B29-F687-4f45-9708-019B960494DF}">
-                <a14:hiddenLine xmlns:a14="http://schemas.microsoft.com/office/drawing/2010/main" xmlns="" w="9525">
+                <a14:hiddenLine xmlns="" xmlns:a14="http://schemas.microsoft.com/office/drawing/2010/main" w="9525">
                   <a:solidFill>
                     <a:srgbClr val="000000"/>
                   </a:solidFill>
@@ -4156,7 +4156,7 @@
             </a:ln>
             <a:extLst>
               <a:ext uri="{91240B29-F687-4f45-9708-019B960494DF}">
-                <a14:hiddenLine xmlns:a14="http://schemas.microsoft.com/office/drawing/2010/main" xmlns="" w="9525">
+                <a14:hiddenLine xmlns="" xmlns:a14="http://schemas.microsoft.com/office/drawing/2010/main" w="9525">
                   <a:solidFill>
                     <a:srgbClr val="000000"/>
                   </a:solidFill>
@@ -4246,7 +4246,7 @@
             </a:ln>
             <a:extLst>
               <a:ext uri="{91240B29-F687-4f45-9708-019B960494DF}">
-                <a14:hiddenLine xmlns:a14="http://schemas.microsoft.com/office/drawing/2010/main" xmlns="" w="9525">
+                <a14:hiddenLine xmlns="" xmlns:a14="http://schemas.microsoft.com/office/drawing/2010/main" w="9525">
                   <a:solidFill>
                     <a:srgbClr val="000000"/>
                   </a:solidFill>
@@ -4308,7 +4308,7 @@
             </a:ln>
             <a:extLst>
               <a:ext uri="{91240B29-F687-4f45-9708-019B960494DF}">
-                <a14:hiddenLine xmlns:a14="http://schemas.microsoft.com/office/drawing/2010/main" xmlns="" w="9525">
+                <a14:hiddenLine xmlns="" xmlns:a14="http://schemas.microsoft.com/office/drawing/2010/main" w="9525">
                   <a:solidFill>
                     <a:srgbClr val="000000"/>
                   </a:solidFill>
@@ -4398,7 +4398,7 @@
             </a:ln>
             <a:extLst>
               <a:ext uri="{91240B29-F687-4f45-9708-019B960494DF}">
-                <a14:hiddenLine xmlns:a14="http://schemas.microsoft.com/office/drawing/2010/main" xmlns="" w="9525">
+                <a14:hiddenLine xmlns="" xmlns:a14="http://schemas.microsoft.com/office/drawing/2010/main" w="9525">
                   <a:solidFill>
                     <a:srgbClr val="000000"/>
                   </a:solidFill>
@@ -4432,7 +4432,7 @@
             </a:ln>
             <a:extLst>
               <a:ext uri="{91240B29-F687-4f45-9708-019B960494DF}">
-                <a14:hiddenLine xmlns:a14="http://schemas.microsoft.com/office/drawing/2010/main" xmlns="" w="9525">
+                <a14:hiddenLine xmlns="" xmlns:a14="http://schemas.microsoft.com/office/drawing/2010/main" w="9525">
                   <a:solidFill>
                     <a:srgbClr val="000000"/>
                   </a:solidFill>
@@ -4497,7 +4497,7 @@
             </a:ln>
             <a:extLst>
               <a:ext uri="{91240B29-F687-4f45-9708-019B960494DF}">
-                <a14:hiddenLine xmlns:a14="http://schemas.microsoft.com/office/drawing/2010/main" xmlns="" w="9525">
+                <a14:hiddenLine xmlns="" xmlns:a14="http://schemas.microsoft.com/office/drawing/2010/main" w="9525">
                   <a:solidFill>
                     <a:srgbClr val="000000"/>
                   </a:solidFill>
@@ -4587,7 +4587,7 @@
             </a:ln>
             <a:extLst>
               <a:ext uri="{91240B29-F687-4f45-9708-019B960494DF}">
-                <a14:hiddenLine xmlns:a14="http://schemas.microsoft.com/office/drawing/2010/main" xmlns="" w="9525">
+                <a14:hiddenLine xmlns="" xmlns:a14="http://schemas.microsoft.com/office/drawing/2010/main" w="9525">
                   <a:solidFill>
                     <a:srgbClr val="000000"/>
                   </a:solidFill>
@@ -4649,7 +4649,7 @@
             </a:ln>
             <a:extLst>
               <a:ext uri="{91240B29-F687-4f45-9708-019B960494DF}">
-                <a14:hiddenLine xmlns:a14="http://schemas.microsoft.com/office/drawing/2010/main" xmlns="" w="9525">
+                <a14:hiddenLine xmlns="" xmlns:a14="http://schemas.microsoft.com/office/drawing/2010/main" w="9525">
                   <a:solidFill>
                     <a:srgbClr val="000000"/>
                   </a:solidFill>
@@ -4739,7 +4739,7 @@
             </a:ln>
             <a:extLst>
               <a:ext uri="{91240B29-F687-4f45-9708-019B960494DF}">
-                <a14:hiddenLine xmlns:a14="http://schemas.microsoft.com/office/drawing/2010/main" xmlns="" w="9525">
+                <a14:hiddenLine xmlns="" xmlns:a14="http://schemas.microsoft.com/office/drawing/2010/main" w="9525">
                   <a:solidFill>
                     <a:srgbClr val="000000"/>
                   </a:solidFill>
@@ -4829,7 +4829,7 @@
             </a:ln>
             <a:extLst>
               <a:ext uri="{91240B29-F687-4f45-9708-019B960494DF}">
-                <a14:hiddenLine xmlns:a14="http://schemas.microsoft.com/office/drawing/2010/main" xmlns="" w="9525">
+                <a14:hiddenLine xmlns="" xmlns:a14="http://schemas.microsoft.com/office/drawing/2010/main" w="9525">
                   <a:solidFill>
                     <a:srgbClr val="000000"/>
                   </a:solidFill>
@@ -4894,7 +4894,7 @@
             </a:ln>
             <a:extLst>
               <a:ext uri="{91240B29-F687-4f45-9708-019B960494DF}">
-                <a14:hiddenLine xmlns:a14="http://schemas.microsoft.com/office/drawing/2010/main" xmlns="" w="9525">
+                <a14:hiddenLine xmlns="" xmlns:a14="http://schemas.microsoft.com/office/drawing/2010/main" w="9525">
                   <a:solidFill>
                     <a:srgbClr val="000000"/>
                   </a:solidFill>
@@ -4956,7 +4956,7 @@
             </a:ln>
             <a:extLst>
               <a:ext uri="{91240B29-F687-4f45-9708-019B960494DF}">
-                <a14:hiddenLine xmlns:a14="http://schemas.microsoft.com/office/drawing/2010/main" xmlns="" w="9525">
+                <a14:hiddenLine xmlns="" xmlns:a14="http://schemas.microsoft.com/office/drawing/2010/main" w="9525">
                   <a:solidFill>
                     <a:srgbClr val="000000"/>
                   </a:solidFill>
@@ -5046,7 +5046,7 @@
             </a:ln>
             <a:extLst>
               <a:ext uri="{91240B29-F687-4f45-9708-019B960494DF}">
-                <a14:hiddenLine xmlns:a14="http://schemas.microsoft.com/office/drawing/2010/main" xmlns="" w="9525">
+                <a14:hiddenLine xmlns="" xmlns:a14="http://schemas.microsoft.com/office/drawing/2010/main" w="9525">
                   <a:solidFill>
                     <a:srgbClr val="000000"/>
                   </a:solidFill>
@@ -5136,7 +5136,7 @@
             </a:ln>
             <a:extLst>
               <a:ext uri="{91240B29-F687-4f45-9708-019B960494DF}">
-                <a14:hiddenLine xmlns:a14="http://schemas.microsoft.com/office/drawing/2010/main" xmlns="" w="9525">
+                <a14:hiddenLine xmlns="" xmlns:a14="http://schemas.microsoft.com/office/drawing/2010/main" w="9525">
                   <a:solidFill>
                     <a:srgbClr val="000000"/>
                   </a:solidFill>
@@ -5198,7 +5198,7 @@
             </a:ln>
             <a:extLst>
               <a:ext uri="{91240B29-F687-4f45-9708-019B960494DF}">
-                <a14:hiddenLine xmlns:a14="http://schemas.microsoft.com/office/drawing/2010/main" xmlns="" w="9525">
+                <a14:hiddenLine xmlns="" xmlns:a14="http://schemas.microsoft.com/office/drawing/2010/main" w="9525">
                   <a:solidFill>
                     <a:srgbClr val="000000"/>
                   </a:solidFill>
@@ -5318,7 +5318,7 @@
             </a:ln>
             <a:extLst>
               <a:ext uri="{91240B29-F687-4f45-9708-019B960494DF}">
-                <a14:hiddenLine xmlns:a14="http://schemas.microsoft.com/office/drawing/2010/main" xmlns="" w="9525">
+                <a14:hiddenLine xmlns="" xmlns:a14="http://schemas.microsoft.com/office/drawing/2010/main" w="9525">
                   <a:solidFill>
                     <a:srgbClr val="000000"/>
                   </a:solidFill>
@@ -5386,7 +5386,7 @@
             </a:ln>
             <a:extLst>
               <a:ext uri="{91240B29-F687-4f45-9708-019B960494DF}">
-                <a14:hiddenLine xmlns:a14="http://schemas.microsoft.com/office/drawing/2010/main" xmlns="" w="9525">
+                <a14:hiddenLine xmlns="" xmlns:a14="http://schemas.microsoft.com/office/drawing/2010/main" w="9525">
                   <a:solidFill>
                     <a:srgbClr val="000000"/>
                   </a:solidFill>
@@ -5476,7 +5476,7 @@
             </a:ln>
             <a:extLst>
               <a:ext uri="{91240B29-F687-4f45-9708-019B960494DF}">
-                <a14:hiddenLine xmlns:a14="http://schemas.microsoft.com/office/drawing/2010/main" xmlns="" w="9525">
+                <a14:hiddenLine xmlns="" xmlns:a14="http://schemas.microsoft.com/office/drawing/2010/main" w="9525">
                   <a:solidFill>
                     <a:srgbClr val="000000"/>
                   </a:solidFill>
@@ -10198,7 +10198,7 @@
           <a:noFill/>
           <a:extLst>
             <a:ext uri="{909E8E84-426E-40dd-AFC4-6F175D3DCCD1}">
-              <a14:hiddenFill xmlns:a14="http://schemas.microsoft.com/office/drawing/2010/main" xmlns="">
+              <a14:hiddenFill xmlns="" xmlns:a14="http://schemas.microsoft.com/office/drawing/2010/main">
                 <a:solidFill>
                   <a:srgbClr val="FFFFFF"/>
                 </a:solidFill>
@@ -10272,7 +10272,7 @@
               </a:ln>
               <a:extLst>
                 <a:ext uri="{91240B29-F687-4f45-9708-019B960494DF}">
-                  <a14:hiddenLine xmlns:a14="http://schemas.microsoft.com/office/drawing/2010/main" xmlns="" w="9525">
+                  <a14:hiddenLine xmlns="" xmlns:a14="http://schemas.microsoft.com/office/drawing/2010/main" w="9525">
                     <a:solidFill>
                       <a:srgbClr val="000000"/>
                     </a:solidFill>
@@ -10362,7 +10362,7 @@
               </a:ln>
               <a:extLst>
                 <a:ext uri="{91240B29-F687-4f45-9708-019B960494DF}">
-                  <a14:hiddenLine xmlns:a14="http://schemas.microsoft.com/office/drawing/2010/main" xmlns="" w="9525">
+                  <a14:hiddenLine xmlns="" xmlns:a14="http://schemas.microsoft.com/office/drawing/2010/main" w="9525">
                     <a:solidFill>
                       <a:srgbClr val="000000"/>
                     </a:solidFill>
@@ -10452,7 +10452,7 @@
               </a:ln>
               <a:extLst>
                 <a:ext uri="{91240B29-F687-4f45-9708-019B960494DF}">
-                  <a14:hiddenLine xmlns:a14="http://schemas.microsoft.com/office/drawing/2010/main" xmlns="" w="9525">
+                  <a14:hiddenLine xmlns="" xmlns:a14="http://schemas.microsoft.com/office/drawing/2010/main" w="9525">
                     <a:solidFill>
                       <a:srgbClr val="000000"/>
                     </a:solidFill>
@@ -10514,7 +10514,7 @@
               </a:ln>
               <a:extLst>
                 <a:ext uri="{91240B29-F687-4f45-9708-019B960494DF}">
-                  <a14:hiddenLine xmlns:a14="http://schemas.microsoft.com/office/drawing/2010/main" xmlns="" w="9525">
+                  <a14:hiddenLine xmlns="" xmlns:a14="http://schemas.microsoft.com/office/drawing/2010/main" w="9525">
                     <a:solidFill>
                       <a:srgbClr val="000000"/>
                     </a:solidFill>
@@ -10604,7 +10604,7 @@
               </a:ln>
               <a:extLst>
                 <a:ext uri="{91240B29-F687-4f45-9708-019B960494DF}">
-                  <a14:hiddenLine xmlns:a14="http://schemas.microsoft.com/office/drawing/2010/main" xmlns="" w="9525">
+                  <a14:hiddenLine xmlns="" xmlns:a14="http://schemas.microsoft.com/office/drawing/2010/main" w="9525">
                     <a:solidFill>
                       <a:srgbClr val="000000"/>
                     </a:solidFill>
@@ -10666,7 +10666,7 @@
               </a:ln>
               <a:extLst>
                 <a:ext uri="{91240B29-F687-4f45-9708-019B960494DF}">
-                  <a14:hiddenLine xmlns:a14="http://schemas.microsoft.com/office/drawing/2010/main" xmlns="" w="9525">
+                  <a14:hiddenLine xmlns="" xmlns:a14="http://schemas.microsoft.com/office/drawing/2010/main" w="9525">
                     <a:solidFill>
                       <a:srgbClr val="000000"/>
                     </a:solidFill>
@@ -10728,7 +10728,7 @@
               </a:ln>
               <a:extLst>
                 <a:ext uri="{91240B29-F687-4f45-9708-019B960494DF}">
-                  <a14:hiddenLine xmlns:a14="http://schemas.microsoft.com/office/drawing/2010/main" xmlns="" w="9525">
+                  <a14:hiddenLine xmlns="" xmlns:a14="http://schemas.microsoft.com/office/drawing/2010/main" w="9525">
                     <a:solidFill>
                       <a:srgbClr val="000000"/>
                     </a:solidFill>
@@ -10818,7 +10818,7 @@
               </a:ln>
               <a:extLst>
                 <a:ext uri="{91240B29-F687-4f45-9708-019B960494DF}">
-                  <a14:hiddenLine xmlns:a14="http://schemas.microsoft.com/office/drawing/2010/main" xmlns="" w="9525">
+                  <a14:hiddenLine xmlns="" xmlns:a14="http://schemas.microsoft.com/office/drawing/2010/main" w="9525">
                     <a:solidFill>
                       <a:srgbClr val="000000"/>
                     </a:solidFill>
@@ -10908,7 +10908,7 @@
               </a:ln>
               <a:extLst>
                 <a:ext uri="{91240B29-F687-4f45-9708-019B960494DF}">
-                  <a14:hiddenLine xmlns:a14="http://schemas.microsoft.com/office/drawing/2010/main" xmlns="" w="9525">
+                  <a14:hiddenLine xmlns="" xmlns:a14="http://schemas.microsoft.com/office/drawing/2010/main" w="9525">
                     <a:solidFill>
                       <a:srgbClr val="000000"/>
                     </a:solidFill>
@@ -10970,7 +10970,7 @@
               </a:ln>
               <a:extLst>
                 <a:ext uri="{91240B29-F687-4f45-9708-019B960494DF}">
-                  <a14:hiddenLine xmlns:a14="http://schemas.microsoft.com/office/drawing/2010/main" xmlns="" w="9525">
+                  <a14:hiddenLine xmlns="" xmlns:a14="http://schemas.microsoft.com/office/drawing/2010/main" w="9525">
                     <a:solidFill>
                       <a:srgbClr val="000000"/>
                     </a:solidFill>
@@ -11080,7 +11080,7 @@
               </a:ln>
               <a:extLst>
                 <a:ext uri="{91240B29-F687-4f45-9708-019B960494DF}">
-                  <a14:hiddenLine xmlns:a14="http://schemas.microsoft.com/office/drawing/2010/main" xmlns="" w="9525">
+                  <a14:hiddenLine xmlns="" xmlns:a14="http://schemas.microsoft.com/office/drawing/2010/main" w="9525">
                     <a:solidFill>
                       <a:srgbClr val="000000"/>
                     </a:solidFill>
@@ -11164,7 +11164,7 @@
               </a:ln>
               <a:extLst>
                 <a:ext uri="{91240B29-F687-4f45-9708-019B960494DF}">
-                  <a14:hiddenLine xmlns:a14="http://schemas.microsoft.com/office/drawing/2010/main" xmlns="" w="9525">
+                  <a14:hiddenLine xmlns="" xmlns:a14="http://schemas.microsoft.com/office/drawing/2010/main" w="9525">
                     <a:solidFill>
                       <a:srgbClr val="000000"/>
                     </a:solidFill>
@@ -11226,7 +11226,7 @@
               </a:ln>
               <a:extLst>
                 <a:ext uri="{91240B29-F687-4f45-9708-019B960494DF}">
-                  <a14:hiddenLine xmlns:a14="http://schemas.microsoft.com/office/drawing/2010/main" xmlns="" w="9525">
+                  <a14:hiddenLine xmlns="" xmlns:a14="http://schemas.microsoft.com/office/drawing/2010/main" w="9525">
                     <a:solidFill>
                       <a:srgbClr val="000000"/>
                     </a:solidFill>
@@ -11288,7 +11288,7 @@
               </a:ln>
               <a:extLst>
                 <a:ext uri="{91240B29-F687-4f45-9708-019B960494DF}">
-                  <a14:hiddenLine xmlns:a14="http://schemas.microsoft.com/office/drawing/2010/main" xmlns="" w="9525">
+                  <a14:hiddenLine xmlns="" xmlns:a14="http://schemas.microsoft.com/office/drawing/2010/main" w="9525">
                     <a:solidFill>
                       <a:srgbClr val="000000"/>
                     </a:solidFill>
@@ -11378,7 +11378,7 @@
               </a:ln>
               <a:extLst>
                 <a:ext uri="{91240B29-F687-4f45-9708-019B960494DF}">
-                  <a14:hiddenLine xmlns:a14="http://schemas.microsoft.com/office/drawing/2010/main" xmlns="" w="9525">
+                  <a14:hiddenLine xmlns="" xmlns:a14="http://schemas.microsoft.com/office/drawing/2010/main" w="9525">
                     <a:solidFill>
                       <a:srgbClr val="000000"/>
                     </a:solidFill>
@@ -11412,7 +11412,7 @@
               </a:ln>
               <a:extLst>
                 <a:ext uri="{91240B29-F687-4f45-9708-019B960494DF}">
-                  <a14:hiddenLine xmlns:a14="http://schemas.microsoft.com/office/drawing/2010/main" xmlns="" w="9525">
+                  <a14:hiddenLine xmlns="" xmlns:a14="http://schemas.microsoft.com/office/drawing/2010/main" w="9525">
                     <a:solidFill>
                       <a:srgbClr val="000000"/>
                     </a:solidFill>
@@ -11477,7 +11477,7 @@
               </a:ln>
               <a:extLst>
                 <a:ext uri="{91240B29-F687-4f45-9708-019B960494DF}">
-                  <a14:hiddenLine xmlns:a14="http://schemas.microsoft.com/office/drawing/2010/main" xmlns="" w="9525">
+                  <a14:hiddenLine xmlns="" xmlns:a14="http://schemas.microsoft.com/office/drawing/2010/main" w="9525">
                     <a:solidFill>
                       <a:srgbClr val="000000"/>
                     </a:solidFill>
@@ -11567,7 +11567,7 @@
               </a:ln>
               <a:extLst>
                 <a:ext uri="{91240B29-F687-4f45-9708-019B960494DF}">
-                  <a14:hiddenLine xmlns:a14="http://schemas.microsoft.com/office/drawing/2010/main" xmlns="" w="9525">
+                  <a14:hiddenLine xmlns="" xmlns:a14="http://schemas.microsoft.com/office/drawing/2010/main" w="9525">
                     <a:solidFill>
                       <a:srgbClr val="000000"/>
                     </a:solidFill>
@@ -11629,7 +11629,7 @@
               </a:ln>
               <a:extLst>
                 <a:ext uri="{91240B29-F687-4f45-9708-019B960494DF}">
-                  <a14:hiddenLine xmlns:a14="http://schemas.microsoft.com/office/drawing/2010/main" xmlns="" w="9525">
+                  <a14:hiddenLine xmlns="" xmlns:a14="http://schemas.microsoft.com/office/drawing/2010/main" w="9525">
                     <a:solidFill>
                       <a:srgbClr val="000000"/>
                     </a:solidFill>
@@ -11719,7 +11719,7 @@
               </a:ln>
               <a:extLst>
                 <a:ext uri="{91240B29-F687-4f45-9708-019B960494DF}">
-                  <a14:hiddenLine xmlns:a14="http://schemas.microsoft.com/office/drawing/2010/main" xmlns="" w="9525">
+                  <a14:hiddenLine xmlns="" xmlns:a14="http://schemas.microsoft.com/office/drawing/2010/main" w="9525">
                     <a:solidFill>
                       <a:srgbClr val="000000"/>
                     </a:solidFill>
@@ -11784,7 +11784,7 @@
               </a:ln>
               <a:extLst>
                 <a:ext uri="{91240B29-F687-4f45-9708-019B960494DF}">
-                  <a14:hiddenLine xmlns:a14="http://schemas.microsoft.com/office/drawing/2010/main" xmlns="" w="9525">
+                  <a14:hiddenLine xmlns="" xmlns:a14="http://schemas.microsoft.com/office/drawing/2010/main" w="9525">
                     <a:solidFill>
                       <a:srgbClr val="000000"/>
                     </a:solidFill>
@@ -11846,7 +11846,7 @@
               </a:ln>
               <a:extLst>
                 <a:ext uri="{91240B29-F687-4f45-9708-019B960494DF}">
-                  <a14:hiddenLine xmlns:a14="http://schemas.microsoft.com/office/drawing/2010/main" xmlns="" w="9525">
+                  <a14:hiddenLine xmlns="" xmlns:a14="http://schemas.microsoft.com/office/drawing/2010/main" w="9525">
                     <a:solidFill>
                       <a:srgbClr val="000000"/>
                     </a:solidFill>
@@ -11936,7 +11936,7 @@
               </a:ln>
               <a:extLst>
                 <a:ext uri="{91240B29-F687-4f45-9708-019B960494DF}">
-                  <a14:hiddenLine xmlns:a14="http://schemas.microsoft.com/office/drawing/2010/main" xmlns="" w="9525">
+                  <a14:hiddenLine xmlns="" xmlns:a14="http://schemas.microsoft.com/office/drawing/2010/main" w="9525">
                     <a:solidFill>
                       <a:srgbClr val="000000"/>
                     </a:solidFill>
@@ -12026,7 +12026,7 @@
               </a:ln>
               <a:extLst>
                 <a:ext uri="{91240B29-F687-4f45-9708-019B960494DF}">
-                  <a14:hiddenLine xmlns:a14="http://schemas.microsoft.com/office/drawing/2010/main" xmlns="" w="9525">
+                  <a14:hiddenLine xmlns="" xmlns:a14="http://schemas.microsoft.com/office/drawing/2010/main" w="9525">
                     <a:solidFill>
                       <a:srgbClr val="000000"/>
                     </a:solidFill>
@@ -12091,7 +12091,7 @@
               </a:ln>
               <a:extLst>
                 <a:ext uri="{91240B29-F687-4f45-9708-019B960494DF}">
-                  <a14:hiddenLine xmlns:a14="http://schemas.microsoft.com/office/drawing/2010/main" xmlns="" w="9525">
+                  <a14:hiddenLine xmlns="" xmlns:a14="http://schemas.microsoft.com/office/drawing/2010/main" w="9525">
                     <a:solidFill>
                       <a:srgbClr val="000000"/>
                     </a:solidFill>
@@ -12211,7 +12211,7 @@
               </a:ln>
               <a:extLst>
                 <a:ext uri="{91240B29-F687-4f45-9708-019B960494DF}">
-                  <a14:hiddenLine xmlns:a14="http://schemas.microsoft.com/office/drawing/2010/main" xmlns="" w="9525">
+                  <a14:hiddenLine xmlns="" xmlns:a14="http://schemas.microsoft.com/office/drawing/2010/main" w="9525">
                     <a:solidFill>
                       <a:srgbClr val="000000"/>
                     </a:solidFill>
@@ -12309,7 +12309,7 @@
               </a:ln>
               <a:extLst>
                 <a:ext uri="{91240B29-F687-4f45-9708-019B960494DF}">
-                  <a14:hiddenLine xmlns:a14="http://schemas.microsoft.com/office/drawing/2010/main" xmlns="" w="9525">
+                  <a14:hiddenLine xmlns="" xmlns:a14="http://schemas.microsoft.com/office/drawing/2010/main" w="9525">
                     <a:solidFill>
                       <a:srgbClr val="000000"/>
                     </a:solidFill>
@@ -12424,7 +12424,7 @@
               </a:ln>
               <a:extLst>
                 <a:ext uri="{91240B29-F687-4f45-9708-019B960494DF}">
-                  <a14:hiddenLine xmlns:a14="http://schemas.microsoft.com/office/drawing/2010/main" xmlns="" w="9525">
+                  <a14:hiddenLine xmlns="" xmlns:a14="http://schemas.microsoft.com/office/drawing/2010/main" w="9525">
                     <a:solidFill>
                       <a:srgbClr val="000000"/>
                     </a:solidFill>
@@ -12514,7 +12514,7 @@
               </a:ln>
               <a:extLst>
                 <a:ext uri="{91240B29-F687-4f45-9708-019B960494DF}">
-                  <a14:hiddenLine xmlns:a14="http://schemas.microsoft.com/office/drawing/2010/main" xmlns="" w="9525">
+                  <a14:hiddenLine xmlns="" xmlns:a14="http://schemas.microsoft.com/office/drawing/2010/main" w="9525">
                     <a:solidFill>
                       <a:srgbClr val="000000"/>
                     </a:solidFill>
@@ -12579,7 +12579,7 @@
               </a:ln>
               <a:extLst>
                 <a:ext uri="{91240B29-F687-4f45-9708-019B960494DF}">
-                  <a14:hiddenLine xmlns:a14="http://schemas.microsoft.com/office/drawing/2010/main" xmlns="" w="9525">
+                  <a14:hiddenLine xmlns="" xmlns:a14="http://schemas.microsoft.com/office/drawing/2010/main" w="9525">
                     <a:solidFill>
                       <a:srgbClr val="000000"/>
                     </a:solidFill>
@@ -12669,7 +12669,7 @@
               </a:ln>
               <a:extLst>
                 <a:ext uri="{91240B29-F687-4f45-9708-019B960494DF}">
-                  <a14:hiddenLine xmlns:a14="http://schemas.microsoft.com/office/drawing/2010/main" xmlns="" w="9525">
+                  <a14:hiddenLine xmlns="" xmlns:a14="http://schemas.microsoft.com/office/drawing/2010/main" w="9525">
                     <a:solidFill>
                       <a:srgbClr val="000000"/>
                     </a:solidFill>
@@ -12737,7 +12737,7 @@
               </a:ln>
               <a:extLst>
                 <a:ext uri="{91240B29-F687-4f45-9708-019B960494DF}">
-                  <a14:hiddenLine xmlns:a14="http://schemas.microsoft.com/office/drawing/2010/main" xmlns="" w="9525">
+                  <a14:hiddenLine xmlns="" xmlns:a14="http://schemas.microsoft.com/office/drawing/2010/main" w="9525">
                     <a:solidFill>
                       <a:srgbClr val="000000"/>
                     </a:solidFill>
@@ -12827,7 +12827,7 @@
               </a:ln>
               <a:extLst>
                 <a:ext uri="{91240B29-F687-4f45-9708-019B960494DF}">
-                  <a14:hiddenLine xmlns:a14="http://schemas.microsoft.com/office/drawing/2010/main" xmlns="" w="9525">
+                  <a14:hiddenLine xmlns="" xmlns:a14="http://schemas.microsoft.com/office/drawing/2010/main" w="9525">
                     <a:solidFill>
                       <a:srgbClr val="000000"/>
                     </a:solidFill>
@@ -12895,7 +12895,7 @@
               </a:ln>
               <a:extLst>
                 <a:ext uri="{91240B29-F687-4f45-9708-019B960494DF}">
-                  <a14:hiddenLine xmlns:a14="http://schemas.microsoft.com/office/drawing/2010/main" xmlns="" w="9525">
+                  <a14:hiddenLine xmlns="" xmlns:a14="http://schemas.microsoft.com/office/drawing/2010/main" w="9525">
                     <a:solidFill>
                       <a:srgbClr val="000000"/>
                     </a:solidFill>
@@ -12985,7 +12985,7 @@
               </a:ln>
               <a:extLst>
                 <a:ext uri="{91240B29-F687-4f45-9708-019B960494DF}">
-                  <a14:hiddenLine xmlns:a14="http://schemas.microsoft.com/office/drawing/2010/main" xmlns="" w="9525">
+                  <a14:hiddenLine xmlns="" xmlns:a14="http://schemas.microsoft.com/office/drawing/2010/main" w="9525">
                     <a:solidFill>
                       <a:srgbClr val="000000"/>
                     </a:solidFill>
@@ -13019,7 +13019,7 @@
               </a:ln>
               <a:extLst>
                 <a:ext uri="{91240B29-F687-4f45-9708-019B960494DF}">
-                  <a14:hiddenLine xmlns:a14="http://schemas.microsoft.com/office/drawing/2010/main" xmlns="" w="9525">
+                  <a14:hiddenLine xmlns="" xmlns:a14="http://schemas.microsoft.com/office/drawing/2010/main" w="9525">
                     <a:solidFill>
                       <a:srgbClr val="000000"/>
                     </a:solidFill>
@@ -13642,7 +13642,15 @@
             <a:pPr algn="ctr"/>
             <a:r>
               <a:rPr lang="en-US" sz="2800" dirty="0" smtClean="0"/>
-              <a:t>Car Sales data set EDA Analysis and Observations</a:t>
+              <a:t>Car Sales </a:t>
+            </a:r>
+            <a:r>
+              <a:rPr lang="en-US" sz="2800" dirty="0" smtClean="0"/>
+              <a:t>dataset </a:t>
+            </a:r>
+            <a:r>
+              <a:rPr lang="en-US" sz="2800" dirty="0" smtClean="0"/>
+              <a:t>EDA Analysis and Observations</a:t>
             </a:r>
           </a:p>
           <a:p>

</xml_diff>